<commit_message>
Updated presentations. More microservices pros & cons
</commit_message>
<xml_diff>
--- a/docs/Introduction_To_Microservices_Part_1_monolith.pptx
+++ b/docs/Introduction_To_Microservices_Part_1_monolith.pptx
@@ -13,7 +13,8 @@
     <p:sldId id="274" r:id="rId7"/>
     <p:sldId id="259" r:id="rId8"/>
     <p:sldId id="257" r:id="rId9"/>
-    <p:sldId id="275" r:id="rId10"/>
+    <p:sldId id="276" r:id="rId10"/>
+    <p:sldId id="275" r:id="rId11"/>
   </p:sldIdLst>
   <p:sldSz cx="12192000" cy="6858000"/>
   <p:notesSz cx="6858000" cy="9144000"/>
@@ -866,7 +867,7 @@
             <a:fld id="{B61BEF0D-F0BB-DE4B-95CE-6DB70DBA9567}" type="datetimeFigureOut">
               <a:rPr lang="en-US" dirty="0"/>
               <a:pPr/>
-              <a:t>8/20/2019</a:t>
+              <a:t>9/2/2019</a:t>
             </a:fld>
             <a:endParaRPr lang="en-US" dirty="0"/>
           </a:p>
@@ -1114,7 +1115,7 @@
             <a:fld id="{B61BEF0D-F0BB-DE4B-95CE-6DB70DBA9567}" type="datetimeFigureOut">
               <a:rPr lang="en-US" dirty="0"/>
               <a:pPr/>
-              <a:t>8/20/2019</a:t>
+              <a:t>9/2/2019</a:t>
             </a:fld>
             <a:endParaRPr lang="en-US" dirty="0"/>
           </a:p>
@@ -1425,7 +1426,7 @@
             <a:fld id="{B61BEF0D-F0BB-DE4B-95CE-6DB70DBA9567}" type="datetimeFigureOut">
               <a:rPr lang="en-US" dirty="0"/>
               <a:pPr/>
-              <a:t>8/20/2019</a:t>
+              <a:t>9/2/2019</a:t>
             </a:fld>
             <a:endParaRPr lang="en-US" dirty="0"/>
           </a:p>
@@ -1755,7 +1756,7 @@
             <a:fld id="{B61BEF0D-F0BB-DE4B-95CE-6DB70DBA9567}" type="datetimeFigureOut">
               <a:rPr lang="en-US" dirty="0"/>
               <a:pPr/>
-              <a:t>8/20/2019</a:t>
+              <a:t>9/2/2019</a:t>
             </a:fld>
             <a:endParaRPr lang="en-US" dirty="0"/>
           </a:p>
@@ -2066,7 +2067,7 @@
             <a:fld id="{B61BEF0D-F0BB-DE4B-95CE-6DB70DBA9567}" type="datetimeFigureOut">
               <a:rPr lang="en-US" dirty="0"/>
               <a:pPr/>
-              <a:t>8/20/2019</a:t>
+              <a:t>9/2/2019</a:t>
             </a:fld>
             <a:endParaRPr lang="en-US" dirty="0"/>
           </a:p>
@@ -2456,7 +2457,7 @@
             <a:fld id="{B61BEF0D-F0BB-DE4B-95CE-6DB70DBA9567}" type="datetimeFigureOut">
               <a:rPr lang="en-US" dirty="0"/>
               <a:pPr/>
-              <a:t>8/20/2019</a:t>
+              <a:t>9/2/2019</a:t>
             </a:fld>
             <a:endParaRPr lang="en-US" dirty="0"/>
           </a:p>
@@ -2622,7 +2623,7 @@
           <a:p>
             <a:fld id="{55C6B4A9-1611-4792-9094-5F34BCA07E0B}" type="datetimeFigureOut">
               <a:rPr lang="en-US" dirty="0"/>
-              <a:t>8/20/2019</a:t>
+              <a:t>9/2/2019</a:t>
             </a:fld>
             <a:endParaRPr lang="en-US" dirty="0"/>
           </a:p>
@@ -2798,7 +2799,7 @@
             <a:fld id="{B61BEF0D-F0BB-DE4B-95CE-6DB70DBA9567}" type="datetimeFigureOut">
               <a:rPr lang="en-US" dirty="0"/>
               <a:pPr/>
-              <a:t>8/20/2019</a:t>
+              <a:t>9/2/2019</a:t>
             </a:fld>
             <a:endParaRPr lang="en-US" dirty="0"/>
           </a:p>
@@ -2964,7 +2965,7 @@
           <a:p>
             <a:fld id="{42A54C80-263E-416B-A8E0-580EDEADCBDC}" type="datetimeFigureOut">
               <a:rPr lang="en-US" dirty="0"/>
-              <a:t>8/20/2019</a:t>
+              <a:t>9/2/2019</a:t>
             </a:fld>
             <a:endParaRPr lang="en-US" dirty="0"/>
           </a:p>
@@ -3207,7 +3208,7 @@
             <a:fld id="{B61BEF0D-F0BB-DE4B-95CE-6DB70DBA9567}" type="datetimeFigureOut">
               <a:rPr lang="en-US" dirty="0"/>
               <a:pPr/>
-              <a:t>8/20/2019</a:t>
+              <a:t>9/2/2019</a:t>
             </a:fld>
             <a:endParaRPr lang="en-US" dirty="0"/>
           </a:p>
@@ -3435,7 +3436,7 @@
           <a:p>
             <a:fld id="{42A54C80-263E-416B-A8E0-580EDEADCBDC}" type="datetimeFigureOut">
               <a:rPr lang="en-US" dirty="0"/>
-              <a:t>8/20/2019</a:t>
+              <a:t>9/2/2019</a:t>
             </a:fld>
             <a:endParaRPr lang="en-US" dirty="0"/>
           </a:p>
@@ -3805,7 +3806,7 @@
             <a:fld id="{B61BEF0D-F0BB-DE4B-95CE-6DB70DBA9567}" type="datetimeFigureOut">
               <a:rPr lang="en-US" dirty="0"/>
               <a:pPr/>
-              <a:t>8/20/2019</a:t>
+              <a:t>9/2/2019</a:t>
             </a:fld>
             <a:endParaRPr lang="en-US" dirty="0"/>
           </a:p>
@@ -3925,7 +3926,7 @@
             <a:fld id="{B61BEF0D-F0BB-DE4B-95CE-6DB70DBA9567}" type="datetimeFigureOut">
               <a:rPr lang="en-US" dirty="0"/>
               <a:pPr/>
-              <a:t>8/20/2019</a:t>
+              <a:t>9/2/2019</a:t>
             </a:fld>
             <a:endParaRPr lang="en-US" dirty="0"/>
           </a:p>
@@ -4017,7 +4018,7 @@
             <a:fld id="{B61BEF0D-F0BB-DE4B-95CE-6DB70DBA9567}" type="datetimeFigureOut">
               <a:rPr lang="en-US" dirty="0"/>
               <a:pPr/>
-              <a:t>8/20/2019</a:t>
+              <a:t>9/2/2019</a:t>
             </a:fld>
             <a:endParaRPr lang="en-US" dirty="0"/>
           </a:p>
@@ -4268,7 +4269,7 @@
           <a:p>
             <a:fld id="{42A54C80-263E-416B-A8E0-580EDEADCBDC}" type="datetimeFigureOut">
               <a:rPr lang="en-US" dirty="0"/>
-              <a:t>8/20/2019</a:t>
+              <a:t>9/2/2019</a:t>
             </a:fld>
             <a:endParaRPr lang="en-US" dirty="0"/>
           </a:p>
@@ -4570,7 +4571,7 @@
             <a:fld id="{B61BEF0D-F0BB-DE4B-95CE-6DB70DBA9567}" type="datetimeFigureOut">
               <a:rPr lang="en-US" dirty="0"/>
               <a:pPr/>
-              <a:t>8/20/2019</a:t>
+              <a:t>9/2/2019</a:t>
             </a:fld>
             <a:endParaRPr lang="en-US" dirty="0"/>
           </a:p>
@@ -5268,7 +5269,7 @@
             <a:fld id="{B61BEF0D-F0BB-DE4B-95CE-6DB70DBA9567}" type="datetimeFigureOut">
               <a:rPr lang="en-US" dirty="0"/>
               <a:pPr/>
-              <a:t>8/20/2019</a:t>
+              <a:t>9/2/2019</a:t>
             </a:fld>
             <a:endParaRPr lang="en-US" dirty="0"/>
           </a:p>
@@ -5911,6 +5912,421 @@
     <p:extLst>
       <p:ext uri="{BB962C8B-B14F-4D97-AF65-F5344CB8AC3E}">
         <p14:creationId xmlns:p14="http://schemas.microsoft.com/office/powerpoint/2010/main" val="2717403406"/>
+      </p:ext>
+    </p:extLst>
+  </p:cSld>
+  <p:clrMapOvr>
+    <a:masterClrMapping/>
+  </p:clrMapOvr>
+</p:sld>
+</file>
+
+<file path=ppt/slides/slide10.xml><?xml version="1.0" encoding="utf-8"?>
+<p:sld xmlns:a="http://schemas.openxmlformats.org/drawingml/2006/main" xmlns:r="http://schemas.openxmlformats.org/officeDocument/2006/relationships" xmlns:p="http://schemas.openxmlformats.org/presentationml/2006/main">
+  <p:cSld>
+    <p:spTree>
+      <p:nvGrpSpPr>
+        <p:cNvPr id="1" name=""/>
+        <p:cNvGrpSpPr/>
+        <p:nvPr/>
+      </p:nvGrpSpPr>
+      <p:grpSpPr>
+        <a:xfrm>
+          <a:off x="0" y="0"/>
+          <a:ext cx="0" cy="0"/>
+          <a:chOff x="0" y="0"/>
+          <a:chExt cx="0" cy="0"/>
+        </a:xfrm>
+      </p:grpSpPr>
+      <p:pic>
+        <p:nvPicPr>
+          <p:cNvPr id="6" name="Picture 5">
+            <a:extLst>
+              <a:ext uri="{FF2B5EF4-FFF2-40B4-BE49-F238E27FC236}">
+                <a16:creationId xmlns:a16="http://schemas.microsoft.com/office/drawing/2014/main" id="{46D9682F-5AE2-4364-9519-CD6E7093E8E7}"/>
+              </a:ext>
+            </a:extLst>
+          </p:cNvPr>
+          <p:cNvPicPr>
+            <a:picLocks noChangeAspect="1"/>
+          </p:cNvPicPr>
+          <p:nvPr/>
+        </p:nvPicPr>
+        <p:blipFill>
+          <a:blip r:embed="rId2">
+            <a:alphaModFix amt="70000"/>
+          </a:blip>
+          <a:stretch>
+            <a:fillRect/>
+          </a:stretch>
+        </p:blipFill>
+        <p:spPr>
+          <a:xfrm>
+            <a:off x="6587154" y="3118360"/>
+            <a:ext cx="5208287" cy="3256304"/>
+          </a:xfrm>
+          <a:prstGeom prst="rect">
+            <a:avLst/>
+          </a:prstGeom>
+        </p:spPr>
+      </p:pic>
+      <p:sp>
+        <p:nvSpPr>
+          <p:cNvPr id="2" name="Title 1">
+            <a:extLst>
+              <a:ext uri="{FF2B5EF4-FFF2-40B4-BE49-F238E27FC236}">
+                <a16:creationId xmlns:a16="http://schemas.microsoft.com/office/drawing/2014/main" id="{7CC41972-BD9E-4B09-9A4B-5D69612E4679}"/>
+              </a:ext>
+            </a:extLst>
+          </p:cNvPr>
+          <p:cNvSpPr>
+            <a:spLocks noGrp="1"/>
+          </p:cNvSpPr>
+          <p:nvPr>
+            <p:ph type="title"/>
+          </p:nvPr>
+        </p:nvSpPr>
+        <p:spPr/>
+        <p:txBody>
+          <a:bodyPr/>
+          <a:lstStyle/>
+          <a:p>
+            <a:r>
+              <a:rPr lang="en-US" dirty="0"/>
+              <a:t>Microservices Drawbacks</a:t>
+            </a:r>
+          </a:p>
+        </p:txBody>
+      </p:sp>
+      <p:sp>
+        <p:nvSpPr>
+          <p:cNvPr id="3" name="Content Placeholder 2">
+            <a:extLst>
+              <a:ext uri="{FF2B5EF4-FFF2-40B4-BE49-F238E27FC236}">
+                <a16:creationId xmlns:a16="http://schemas.microsoft.com/office/drawing/2014/main" id="{12DAB586-E7BF-4AB5-AB32-A259FE3100D3}"/>
+              </a:ext>
+            </a:extLst>
+          </p:cNvPr>
+          <p:cNvSpPr>
+            <a:spLocks noGrp="1"/>
+          </p:cNvSpPr>
+          <p:nvPr>
+            <p:ph idx="1"/>
+          </p:nvPr>
+        </p:nvSpPr>
+        <p:spPr>
+          <a:xfrm>
+            <a:off x="490721" y="1250488"/>
+            <a:ext cx="9106125" cy="1629747"/>
+          </a:xfrm>
+        </p:spPr>
+        <p:txBody>
+          <a:bodyPr>
+            <a:noAutofit/>
+          </a:bodyPr>
+          <a:lstStyle/>
+          <a:p>
+            <a:r>
+              <a:rPr lang="en-US" sz="1600" b="1" dirty="0"/>
+              <a:t>Smaller Is Not Faster. </a:t>
+            </a:r>
+            <a:r>
+              <a:rPr lang="en-US" sz="1600" dirty="0"/>
+              <a:t>Every service is connected through remote calls. Such calls take time, especially when many services are called in at once. </a:t>
+            </a:r>
+          </a:p>
+          <a:p>
+            <a:r>
+              <a:rPr lang="en-US" sz="1600" dirty="0"/>
+              <a:t>Significant DevOps efforts are required to monitor &amp; support infrastructure and often deployments.</a:t>
+            </a:r>
+          </a:p>
+          <a:p>
+            <a:r>
+              <a:rPr lang="en-US" sz="1600" dirty="0"/>
+              <a:t>It is often hard or impossible to implement distributed transactions in Microservices. There is Eventual Consistency model comes to help. However it might have significant impact on the style of interaction with users in the system.</a:t>
+            </a:r>
+          </a:p>
+        </p:txBody>
+      </p:sp>
+      <p:sp>
+        <p:nvSpPr>
+          <p:cNvPr id="5" name="Content Placeholder 2">
+            <a:extLst>
+              <a:ext uri="{FF2B5EF4-FFF2-40B4-BE49-F238E27FC236}">
+                <a16:creationId xmlns:a16="http://schemas.microsoft.com/office/drawing/2014/main" id="{AA64B2CF-4B22-4178-92DE-4D47809AC0F5}"/>
+              </a:ext>
+            </a:extLst>
+          </p:cNvPr>
+          <p:cNvSpPr txBox="1">
+            <a:spLocks/>
+          </p:cNvSpPr>
+          <p:nvPr/>
+        </p:nvSpPr>
+        <p:spPr>
+          <a:xfrm>
+            <a:off x="490719" y="3299449"/>
+            <a:ext cx="6606767" cy="4136581"/>
+          </a:xfrm>
+          <a:prstGeom prst="rect">
+            <a:avLst/>
+          </a:prstGeom>
+        </p:spPr>
+        <p:txBody>
+          <a:bodyPr vert="horz" lIns="91440" tIns="45720" rIns="91440" bIns="45720" rtlCol="0">
+            <a:normAutofit/>
+          </a:bodyPr>
+          <a:lstStyle>
+            <a:lvl1pPr marL="342900" indent="-342900" algn="l" defTabSz="457200" rtl="0" eaLnBrk="1" latinLnBrk="0" hangingPunct="1">
+              <a:spcBef>
+                <a:spcPts val="1000"/>
+              </a:spcBef>
+              <a:spcAft>
+                <a:spcPts val="0"/>
+              </a:spcAft>
+              <a:buClr>
+                <a:schemeClr val="accent1"/>
+              </a:buClr>
+              <a:buSzPct val="80000"/>
+              <a:buFont typeface="Wingdings 3" charset="2"/>
+              <a:buChar char=""/>
+              <a:defRPr sz="1800" kern="1200">
+                <a:solidFill>
+                  <a:schemeClr val="tx1">
+                    <a:lumMod val="75000"/>
+                    <a:lumOff val="25000"/>
+                  </a:schemeClr>
+                </a:solidFill>
+                <a:latin typeface="+mn-lt"/>
+                <a:ea typeface="+mn-ea"/>
+                <a:cs typeface="+mn-cs"/>
+              </a:defRPr>
+            </a:lvl1pPr>
+            <a:lvl2pPr marL="742950" indent="-285750" algn="l" defTabSz="457200" rtl="0" eaLnBrk="1" latinLnBrk="0" hangingPunct="1">
+              <a:spcBef>
+                <a:spcPts val="1000"/>
+              </a:spcBef>
+              <a:spcAft>
+                <a:spcPts val="0"/>
+              </a:spcAft>
+              <a:buClr>
+                <a:schemeClr val="accent1"/>
+              </a:buClr>
+              <a:buSzPct val="80000"/>
+              <a:buFont typeface="Wingdings 3" charset="2"/>
+              <a:buChar char=""/>
+              <a:defRPr sz="1600" kern="1200">
+                <a:solidFill>
+                  <a:schemeClr val="tx1">
+                    <a:lumMod val="75000"/>
+                    <a:lumOff val="25000"/>
+                  </a:schemeClr>
+                </a:solidFill>
+                <a:latin typeface="+mn-lt"/>
+                <a:ea typeface="+mn-ea"/>
+                <a:cs typeface="+mn-cs"/>
+              </a:defRPr>
+            </a:lvl2pPr>
+            <a:lvl3pPr marL="1143000" indent="-228600" algn="l" defTabSz="457200" rtl="0" eaLnBrk="1" latinLnBrk="0" hangingPunct="1">
+              <a:spcBef>
+                <a:spcPts val="1000"/>
+              </a:spcBef>
+              <a:spcAft>
+                <a:spcPts val="0"/>
+              </a:spcAft>
+              <a:buClr>
+                <a:schemeClr val="accent1"/>
+              </a:buClr>
+              <a:buSzPct val="80000"/>
+              <a:buFont typeface="Wingdings 3" charset="2"/>
+              <a:buChar char=""/>
+              <a:defRPr sz="1400" kern="1200">
+                <a:solidFill>
+                  <a:schemeClr val="tx1">
+                    <a:lumMod val="75000"/>
+                    <a:lumOff val="25000"/>
+                  </a:schemeClr>
+                </a:solidFill>
+                <a:latin typeface="+mn-lt"/>
+                <a:ea typeface="+mn-ea"/>
+                <a:cs typeface="+mn-cs"/>
+              </a:defRPr>
+            </a:lvl3pPr>
+            <a:lvl4pPr marL="1600200" indent="-228600" algn="l" defTabSz="457200" rtl="0" eaLnBrk="1" latinLnBrk="0" hangingPunct="1">
+              <a:spcBef>
+                <a:spcPts val="1000"/>
+              </a:spcBef>
+              <a:spcAft>
+                <a:spcPts val="0"/>
+              </a:spcAft>
+              <a:buClr>
+                <a:schemeClr val="accent1"/>
+              </a:buClr>
+              <a:buSzPct val="80000"/>
+              <a:buFont typeface="Wingdings 3" charset="2"/>
+              <a:buChar char=""/>
+              <a:defRPr sz="1200" kern="1200">
+                <a:solidFill>
+                  <a:schemeClr val="tx1">
+                    <a:lumMod val="75000"/>
+                    <a:lumOff val="25000"/>
+                  </a:schemeClr>
+                </a:solidFill>
+                <a:latin typeface="+mn-lt"/>
+                <a:ea typeface="+mn-ea"/>
+                <a:cs typeface="+mn-cs"/>
+              </a:defRPr>
+            </a:lvl4pPr>
+            <a:lvl5pPr marL="2057400" indent="-228600" algn="l" defTabSz="457200" rtl="0" eaLnBrk="1" latinLnBrk="0" hangingPunct="1">
+              <a:spcBef>
+                <a:spcPts val="1000"/>
+              </a:spcBef>
+              <a:spcAft>
+                <a:spcPts val="0"/>
+              </a:spcAft>
+              <a:buClr>
+                <a:schemeClr val="accent1"/>
+              </a:buClr>
+              <a:buSzPct val="80000"/>
+              <a:buFont typeface="Wingdings 3" charset="2"/>
+              <a:buChar char=""/>
+              <a:defRPr sz="1200" kern="1200">
+                <a:solidFill>
+                  <a:schemeClr val="tx1">
+                    <a:lumMod val="75000"/>
+                    <a:lumOff val="25000"/>
+                  </a:schemeClr>
+                </a:solidFill>
+                <a:latin typeface="+mn-lt"/>
+                <a:ea typeface="+mn-ea"/>
+                <a:cs typeface="+mn-cs"/>
+              </a:defRPr>
+            </a:lvl5pPr>
+            <a:lvl6pPr marL="2514600" indent="-228600" algn="l" defTabSz="457200" rtl="0" eaLnBrk="1" latinLnBrk="0" hangingPunct="1">
+              <a:spcBef>
+                <a:spcPts val="1000"/>
+              </a:spcBef>
+              <a:spcAft>
+                <a:spcPts val="0"/>
+              </a:spcAft>
+              <a:buClr>
+                <a:schemeClr val="accent1"/>
+              </a:buClr>
+              <a:buSzPct val="80000"/>
+              <a:buFont typeface="Wingdings 3" charset="2"/>
+              <a:buChar char=""/>
+              <a:defRPr sz="1200" kern="1200">
+                <a:solidFill>
+                  <a:schemeClr val="tx1">
+                    <a:lumMod val="75000"/>
+                    <a:lumOff val="25000"/>
+                  </a:schemeClr>
+                </a:solidFill>
+                <a:latin typeface="+mn-lt"/>
+                <a:ea typeface="+mn-ea"/>
+                <a:cs typeface="+mn-cs"/>
+              </a:defRPr>
+            </a:lvl6pPr>
+            <a:lvl7pPr marL="2971800" indent="-228600" algn="l" defTabSz="457200" rtl="0" eaLnBrk="1" latinLnBrk="0" hangingPunct="1">
+              <a:spcBef>
+                <a:spcPts val="1000"/>
+              </a:spcBef>
+              <a:spcAft>
+                <a:spcPts val="0"/>
+              </a:spcAft>
+              <a:buClr>
+                <a:schemeClr val="accent1"/>
+              </a:buClr>
+              <a:buSzPct val="80000"/>
+              <a:buFont typeface="Wingdings 3" charset="2"/>
+              <a:buChar char=""/>
+              <a:defRPr sz="1200" kern="1200">
+                <a:solidFill>
+                  <a:schemeClr val="tx1">
+                    <a:lumMod val="75000"/>
+                    <a:lumOff val="25000"/>
+                  </a:schemeClr>
+                </a:solidFill>
+                <a:latin typeface="+mn-lt"/>
+                <a:ea typeface="+mn-ea"/>
+                <a:cs typeface="+mn-cs"/>
+              </a:defRPr>
+            </a:lvl7pPr>
+            <a:lvl8pPr marL="3429000" indent="-228600" algn="l" defTabSz="457200" rtl="0" eaLnBrk="1" latinLnBrk="0" hangingPunct="1">
+              <a:spcBef>
+                <a:spcPts val="1000"/>
+              </a:spcBef>
+              <a:spcAft>
+                <a:spcPts val="0"/>
+              </a:spcAft>
+              <a:buClr>
+                <a:schemeClr val="accent1"/>
+              </a:buClr>
+              <a:buSzPct val="80000"/>
+              <a:buFont typeface="Wingdings 3" charset="2"/>
+              <a:buChar char=""/>
+              <a:defRPr sz="1200" kern="1200">
+                <a:solidFill>
+                  <a:schemeClr val="tx1">
+                    <a:lumMod val="75000"/>
+                    <a:lumOff val="25000"/>
+                  </a:schemeClr>
+                </a:solidFill>
+                <a:latin typeface="+mn-lt"/>
+                <a:ea typeface="+mn-ea"/>
+                <a:cs typeface="+mn-cs"/>
+              </a:defRPr>
+            </a:lvl8pPr>
+            <a:lvl9pPr marL="3886200" indent="-228600" algn="l" defTabSz="457200" rtl="0" eaLnBrk="1" latinLnBrk="0" hangingPunct="1">
+              <a:spcBef>
+                <a:spcPts val="1000"/>
+              </a:spcBef>
+              <a:spcAft>
+                <a:spcPts val="0"/>
+              </a:spcAft>
+              <a:buClr>
+                <a:schemeClr val="accent1"/>
+              </a:buClr>
+              <a:buSzPct val="80000"/>
+              <a:buFont typeface="Wingdings 3" charset="2"/>
+              <a:buChar char=""/>
+              <a:defRPr sz="1200" kern="1200">
+                <a:solidFill>
+                  <a:schemeClr val="tx1">
+                    <a:lumMod val="75000"/>
+                    <a:lumOff val="25000"/>
+                  </a:schemeClr>
+                </a:solidFill>
+                <a:latin typeface="+mn-lt"/>
+                <a:ea typeface="+mn-ea"/>
+                <a:cs typeface="+mn-cs"/>
+              </a:defRPr>
+            </a:lvl9pPr>
+          </a:lstStyle>
+          <a:p>
+            <a:r>
+              <a:rPr lang="en-US" sz="1600" dirty="0"/>
+              <a:t>Significant efforts are required to plan and keep interfaces consistency between microservices. If one team changes the protocol – other services might stop working.</a:t>
+            </a:r>
+          </a:p>
+          <a:p>
+            <a:r>
+              <a:rPr lang="en-US" sz="1600" dirty="0"/>
+              <a:t>Microservices are modeled as isolated units that manage a reduced set of problems. However, in reality fully functional systems rely on the cooperation and integration of its parts. Often it is hard to make microservices truly independent. </a:t>
+            </a:r>
+          </a:p>
+          <a:p>
+            <a:r>
+              <a:rPr lang="en-US" sz="1600" dirty="0"/>
+              <a:t>One important question you should ask yourself when working with separate microservices inside a problem domain is: “Are these services talking too much with each other?” If so, consider to merge them to a single service. Microservices should be small, but no smaller than necessary to be convenient.</a:t>
+            </a:r>
+          </a:p>
+        </p:txBody>
+      </p:sp>
+    </p:spTree>
+    <p:extLst>
+      <p:ext uri="{BB962C8B-B14F-4D97-AF65-F5344CB8AC3E}">
+        <p14:creationId xmlns:p14="http://schemas.microsoft.com/office/powerpoint/2010/main" val="2317993237"/>
       </p:ext>
     </p:extLst>
   </p:cSld>
@@ -8020,16 +8436,7 @@
                 </a:solidFill>
                 <a:latin typeface="Open Sans"/>
               </a:rPr>
-              <a:t>Vertical scalability is dominant</a:t>
-            </a:r>
-            <a:r>
-              <a:rPr lang="en-US" dirty="0" smtClean="0">
-                <a:solidFill>
-                  <a:srgbClr val="444444"/>
-                </a:solidFill>
-                <a:latin typeface="Open Sans"/>
-              </a:rPr>
-              <a:t>*</a:t>
+              <a:t>Vertical scalability is dominant*</a:t>
             </a:r>
           </a:p>
           <a:p>
@@ -8038,7 +8445,7 @@
               <a:buChar char="•"/>
             </a:pPr>
             <a:r>
-              <a:rPr lang="en-US" dirty="0" smtClean="0">
+              <a:rPr lang="en-US" dirty="0">
                 <a:solidFill>
                   <a:srgbClr val="444444"/>
                 </a:solidFill>
@@ -8046,12 +8453,6 @@
               </a:rPr>
               <a:t>As result - long release lifecycle</a:t>
             </a:r>
-            <a:endParaRPr lang="en-US" dirty="0">
-              <a:solidFill>
-                <a:srgbClr val="444444"/>
-              </a:solidFill>
-              <a:latin typeface="Open Sans"/>
-            </a:endParaRPr>
           </a:p>
         </p:txBody>
       </p:sp>
@@ -10289,7 +10690,7 @@
                 </a:solidFill>
                 <a:latin typeface="Open Sans"/>
               </a:rPr>
-              <a:t>If one of the components fails, developers are able to spin up it’s copy while the rest of the application continues to function independently.</a:t>
+              <a:t>If one of the components fails, developers can spin up it’s copy while the rest of the application continues to function independently.</a:t>
             </a:r>
           </a:p>
           <a:p>
@@ -10871,8 +11272,8 @@
         </p:nvSpPr>
         <p:spPr>
           <a:xfrm>
-            <a:off x="3438782" y="1344007"/>
-            <a:ext cx="6647050" cy="5120801"/>
+            <a:off x="3346705" y="1344007"/>
+            <a:ext cx="6739127" cy="5120801"/>
           </a:xfrm>
         </p:spPr>
         <p:txBody>
@@ -10974,7 +11375,7 @@
         </p:blipFill>
         <p:spPr bwMode="auto">
           <a:xfrm>
-            <a:off x="677333" y="1344007"/>
+            <a:off x="610658" y="1344007"/>
             <a:ext cx="2669371" cy="4819049"/>
           </a:xfrm>
           <a:prstGeom prst="rect">
@@ -11024,10 +11425,10 @@
       </p:grpSpPr>
       <p:pic>
         <p:nvPicPr>
-          <p:cNvPr id="6" name="Picture 5">
+          <p:cNvPr id="7" name="Picture 6">
             <a:extLst>
               <a:ext uri="{FF2B5EF4-FFF2-40B4-BE49-F238E27FC236}">
-                <a16:creationId xmlns:a16="http://schemas.microsoft.com/office/drawing/2014/main" id="{46D9682F-5AE2-4364-9519-CD6E7093E8E7}"/>
+                <a16:creationId xmlns:a16="http://schemas.microsoft.com/office/drawing/2014/main" id="{E870CF12-9C94-4144-8439-59B7494C72E2}"/>
               </a:ext>
             </a:extLst>
           </p:cNvPr>
@@ -11037,17 +11438,15 @@
           <p:nvPr/>
         </p:nvPicPr>
         <p:blipFill>
-          <a:blip r:embed="rId2">
-            <a:alphaModFix amt="70000"/>
-          </a:blip>
+          <a:blip r:embed="rId2"/>
           <a:stretch>
             <a:fillRect/>
           </a:stretch>
         </p:blipFill>
         <p:spPr>
           <a:xfrm>
-            <a:off x="6587154" y="3118360"/>
-            <a:ext cx="5208287" cy="3256304"/>
+            <a:off x="5806852" y="4090492"/>
+            <a:ext cx="5385023" cy="2497402"/>
           </a:xfrm>
           <a:prstGeom prst="rect">
             <a:avLst/>
@@ -11059,7 +11458,7 @@
           <p:cNvPr id="2" name="Title 1">
             <a:extLst>
               <a:ext uri="{FF2B5EF4-FFF2-40B4-BE49-F238E27FC236}">
-                <a16:creationId xmlns:a16="http://schemas.microsoft.com/office/drawing/2014/main" id="{7CC41972-BD9E-4B09-9A4B-5D69612E4679}"/>
+                <a16:creationId xmlns:a16="http://schemas.microsoft.com/office/drawing/2014/main" id="{79A39645-99C1-4C24-A7C3-D26AF03B5B02}"/>
               </a:ext>
             </a:extLst>
           </p:cNvPr>
@@ -11077,8 +11476,9 @@
           <a:p>
             <a:r>
               <a:rPr lang="en-US" dirty="0"/>
-              <a:t>Microservices Drawbacks</a:t>
-            </a:r>
+              <a:t>Microservices Benefits</a:t>
+            </a:r>
+            <a:endParaRPr lang="pl-PL" dirty="0"/>
           </a:p>
         </p:txBody>
       </p:sp>
@@ -11087,7 +11487,7 @@
           <p:cNvPr id="3" name="Content Placeholder 2">
             <a:extLst>
               <a:ext uri="{FF2B5EF4-FFF2-40B4-BE49-F238E27FC236}">
-                <a16:creationId xmlns:a16="http://schemas.microsoft.com/office/drawing/2014/main" id="{12DAB586-E7BF-4AB5-AB32-A259FE3100D3}"/>
+                <a16:creationId xmlns:a16="http://schemas.microsoft.com/office/drawing/2014/main" id="{04F77667-BF7D-4E6F-9F92-77784A56252D}"/>
               </a:ext>
             </a:extLst>
           </p:cNvPr>
@@ -11100,325 +11500,139 @@
         </p:nvSpPr>
         <p:spPr>
           <a:xfrm>
-            <a:off x="490721" y="1488613"/>
-            <a:ext cx="9106125" cy="1629747"/>
+            <a:off x="677334" y="1400175"/>
+            <a:ext cx="7399866" cy="4507837"/>
           </a:xfrm>
         </p:spPr>
         <p:txBody>
-          <a:bodyPr>
-            <a:normAutofit fontScale="85000" lnSpcReduction="10000"/>
-          </a:bodyPr>
+          <a:bodyPr/>
           <a:lstStyle/>
           <a:p>
             <a:r>
-              <a:rPr lang="en-US" b="1" dirty="0"/>
-              <a:t>Smaller Is Not Faster. </a:t>
-            </a:r>
-            <a:r>
               <a:rPr lang="en-US" dirty="0"/>
-              <a:t>Every service is connected through remote calls. Such calls take time, especially when many services </a:t>
-            </a:r>
-            <a:r>
-              <a:rPr lang="en-US" sz="1900" dirty="0"/>
-              <a:t>are</a:t>
-            </a:r>
+              <a:t>New features development doesn’t break existing code.</a:t>
+            </a:r>
+          </a:p>
+          <a:p>
             <a:r>
               <a:rPr lang="en-US" dirty="0"/>
-              <a:t> called in at once. </a:t>
+              <a:t>Services could be created using different languages and technologies until they share the same API protocols.</a:t>
             </a:r>
           </a:p>
           <a:p>
             <a:r>
               <a:rPr lang="en-US" dirty="0"/>
-              <a:t>Significant DevOps efforts are required to support infrastructure and often deployments.</a:t>
+              <a:t>Small isolated services are way easier to test.</a:t>
             </a:r>
           </a:p>
           <a:p>
             <a:r>
               <a:rPr lang="en-US" dirty="0"/>
-              <a:t>It is often hard or impossible to implement distributed transactions in Microservices. There is Eventual Consistency model comes to help. However it might have significant impact on the style of interaction with users in the system.</a:t>
-            </a:r>
-          </a:p>
-        </p:txBody>
-      </p:sp>
-      <p:sp>
-        <p:nvSpPr>
-          <p:cNvPr id="5" name="Content Placeholder 2">
+              <a:t>Scalability &amp; maintenance of small components is simple. You can scale horizontally only heavily used services.</a:t>
+            </a:r>
+          </a:p>
+          <a:p>
+            <a:r>
+              <a:rPr lang="en-US" dirty="0"/>
+              <a:t>Refactoring and modernization of existing components is easier because both old and new versions can coexist in production. </a:t>
+            </a:r>
+          </a:p>
+          <a:p>
+            <a:r>
+              <a:rPr lang="en-US" dirty="0"/>
+              <a:t>Beta testers could use new version while existing customer could continue using “classic” application until it’s EOL period.</a:t>
+            </a:r>
+          </a:p>
+          <a:p>
+            <a:endParaRPr lang="pl-PL" dirty="0"/>
+          </a:p>
+        </p:txBody>
+      </p:sp>
+      <p:sp>
+        <p:nvSpPr>
+          <p:cNvPr id="4" name="AutoShape 2">
             <a:extLst>
               <a:ext uri="{FF2B5EF4-FFF2-40B4-BE49-F238E27FC236}">
-                <a16:creationId xmlns:a16="http://schemas.microsoft.com/office/drawing/2014/main" id="{AA64B2CF-4B22-4178-92DE-4D47809AC0F5}"/>
+                <a16:creationId xmlns:a16="http://schemas.microsoft.com/office/drawing/2014/main" id="{D0198941-2A8A-4A90-B913-6E2DC4745932}"/>
               </a:ext>
             </a:extLst>
           </p:cNvPr>
-          <p:cNvSpPr txBox="1">
-            <a:spLocks/>
+          <p:cNvSpPr>
+            <a:spLocks noChangeAspect="1" noChangeArrowheads="1"/>
           </p:cNvSpPr>
           <p:nvPr/>
         </p:nvSpPr>
-        <p:spPr>
+        <p:spPr bwMode="auto">
           <a:xfrm>
-            <a:off x="490719" y="3108949"/>
-            <a:ext cx="6606767" cy="4136581"/>
+            <a:off x="5943600" y="3276600"/>
+            <a:ext cx="304800" cy="304800"/>
           </a:xfrm>
           <a:prstGeom prst="rect">
             <a:avLst/>
           </a:prstGeom>
+          <a:noFill/>
+          <a:extLst>
+            <a:ext uri="{909E8E84-426E-40DD-AFC4-6F175D3DCCD1}">
+              <a14:hiddenFill xmlns:a14="http://schemas.microsoft.com/office/drawing/2010/main">
+                <a:solidFill>
+                  <a:srgbClr val="FFFFFF"/>
+                </a:solidFill>
+              </a14:hiddenFill>
+            </a:ext>
+          </a:extLst>
         </p:spPr>
         <p:txBody>
-          <a:bodyPr vert="horz" lIns="91440" tIns="45720" rIns="91440" bIns="45720" rtlCol="0">
-            <a:normAutofit/>
+          <a:bodyPr vert="horz" wrap="square" lIns="91440" tIns="45720" rIns="91440" bIns="45720" numCol="1" anchor="t" anchorCtr="0" compatLnSpc="1">
+            <a:prstTxWarp prst="textNoShape">
+              <a:avLst/>
+            </a:prstTxWarp>
           </a:bodyPr>
-          <a:lstStyle>
-            <a:lvl1pPr marL="342900" indent="-342900" algn="l" defTabSz="457200" rtl="0" eaLnBrk="1" latinLnBrk="0" hangingPunct="1">
-              <a:spcBef>
-                <a:spcPts val="1000"/>
-              </a:spcBef>
-              <a:spcAft>
-                <a:spcPts val="0"/>
-              </a:spcAft>
-              <a:buClr>
-                <a:schemeClr val="accent1"/>
-              </a:buClr>
-              <a:buSzPct val="80000"/>
-              <a:buFont typeface="Wingdings 3" charset="2"/>
-              <a:buChar char=""/>
-              <a:defRPr sz="1800" kern="1200">
-                <a:solidFill>
-                  <a:schemeClr val="tx1">
-                    <a:lumMod val="75000"/>
-                    <a:lumOff val="25000"/>
-                  </a:schemeClr>
-                </a:solidFill>
-                <a:latin typeface="+mn-lt"/>
-                <a:ea typeface="+mn-ea"/>
-                <a:cs typeface="+mn-cs"/>
-              </a:defRPr>
-            </a:lvl1pPr>
-            <a:lvl2pPr marL="742950" indent="-285750" algn="l" defTabSz="457200" rtl="0" eaLnBrk="1" latinLnBrk="0" hangingPunct="1">
-              <a:spcBef>
-                <a:spcPts val="1000"/>
-              </a:spcBef>
-              <a:spcAft>
-                <a:spcPts val="0"/>
-              </a:spcAft>
-              <a:buClr>
-                <a:schemeClr val="accent1"/>
-              </a:buClr>
-              <a:buSzPct val="80000"/>
-              <a:buFont typeface="Wingdings 3" charset="2"/>
-              <a:buChar char=""/>
-              <a:defRPr sz="1600" kern="1200">
-                <a:solidFill>
-                  <a:schemeClr val="tx1">
-                    <a:lumMod val="75000"/>
-                    <a:lumOff val="25000"/>
-                  </a:schemeClr>
-                </a:solidFill>
-                <a:latin typeface="+mn-lt"/>
-                <a:ea typeface="+mn-ea"/>
-                <a:cs typeface="+mn-cs"/>
-              </a:defRPr>
-            </a:lvl2pPr>
-            <a:lvl3pPr marL="1143000" indent="-228600" algn="l" defTabSz="457200" rtl="0" eaLnBrk="1" latinLnBrk="0" hangingPunct="1">
-              <a:spcBef>
-                <a:spcPts val="1000"/>
-              </a:spcBef>
-              <a:spcAft>
-                <a:spcPts val="0"/>
-              </a:spcAft>
-              <a:buClr>
-                <a:schemeClr val="accent1"/>
-              </a:buClr>
-              <a:buSzPct val="80000"/>
-              <a:buFont typeface="Wingdings 3" charset="2"/>
-              <a:buChar char=""/>
-              <a:defRPr sz="1400" kern="1200">
-                <a:solidFill>
-                  <a:schemeClr val="tx1">
-                    <a:lumMod val="75000"/>
-                    <a:lumOff val="25000"/>
-                  </a:schemeClr>
-                </a:solidFill>
-                <a:latin typeface="+mn-lt"/>
-                <a:ea typeface="+mn-ea"/>
-                <a:cs typeface="+mn-cs"/>
-              </a:defRPr>
-            </a:lvl3pPr>
-            <a:lvl4pPr marL="1600200" indent="-228600" algn="l" defTabSz="457200" rtl="0" eaLnBrk="1" latinLnBrk="0" hangingPunct="1">
-              <a:spcBef>
-                <a:spcPts val="1000"/>
-              </a:spcBef>
-              <a:spcAft>
-                <a:spcPts val="0"/>
-              </a:spcAft>
-              <a:buClr>
-                <a:schemeClr val="accent1"/>
-              </a:buClr>
-              <a:buSzPct val="80000"/>
-              <a:buFont typeface="Wingdings 3" charset="2"/>
-              <a:buChar char=""/>
-              <a:defRPr sz="1200" kern="1200">
-                <a:solidFill>
-                  <a:schemeClr val="tx1">
-                    <a:lumMod val="75000"/>
-                    <a:lumOff val="25000"/>
-                  </a:schemeClr>
-                </a:solidFill>
-                <a:latin typeface="+mn-lt"/>
-                <a:ea typeface="+mn-ea"/>
-                <a:cs typeface="+mn-cs"/>
-              </a:defRPr>
-            </a:lvl4pPr>
-            <a:lvl5pPr marL="2057400" indent="-228600" algn="l" defTabSz="457200" rtl="0" eaLnBrk="1" latinLnBrk="0" hangingPunct="1">
-              <a:spcBef>
-                <a:spcPts val="1000"/>
-              </a:spcBef>
-              <a:spcAft>
-                <a:spcPts val="0"/>
-              </a:spcAft>
-              <a:buClr>
-                <a:schemeClr val="accent1"/>
-              </a:buClr>
-              <a:buSzPct val="80000"/>
-              <a:buFont typeface="Wingdings 3" charset="2"/>
-              <a:buChar char=""/>
-              <a:defRPr sz="1200" kern="1200">
-                <a:solidFill>
-                  <a:schemeClr val="tx1">
-                    <a:lumMod val="75000"/>
-                    <a:lumOff val="25000"/>
-                  </a:schemeClr>
-                </a:solidFill>
-                <a:latin typeface="+mn-lt"/>
-                <a:ea typeface="+mn-ea"/>
-                <a:cs typeface="+mn-cs"/>
-              </a:defRPr>
-            </a:lvl5pPr>
-            <a:lvl6pPr marL="2514600" indent="-228600" algn="l" defTabSz="457200" rtl="0" eaLnBrk="1" latinLnBrk="0" hangingPunct="1">
-              <a:spcBef>
-                <a:spcPts val="1000"/>
-              </a:spcBef>
-              <a:spcAft>
-                <a:spcPts val="0"/>
-              </a:spcAft>
-              <a:buClr>
-                <a:schemeClr val="accent1"/>
-              </a:buClr>
-              <a:buSzPct val="80000"/>
-              <a:buFont typeface="Wingdings 3" charset="2"/>
-              <a:buChar char=""/>
-              <a:defRPr sz="1200" kern="1200">
-                <a:solidFill>
-                  <a:schemeClr val="tx1">
-                    <a:lumMod val="75000"/>
-                    <a:lumOff val="25000"/>
-                  </a:schemeClr>
-                </a:solidFill>
-                <a:latin typeface="+mn-lt"/>
-                <a:ea typeface="+mn-ea"/>
-                <a:cs typeface="+mn-cs"/>
-              </a:defRPr>
-            </a:lvl6pPr>
-            <a:lvl7pPr marL="2971800" indent="-228600" algn="l" defTabSz="457200" rtl="0" eaLnBrk="1" latinLnBrk="0" hangingPunct="1">
-              <a:spcBef>
-                <a:spcPts val="1000"/>
-              </a:spcBef>
-              <a:spcAft>
-                <a:spcPts val="0"/>
-              </a:spcAft>
-              <a:buClr>
-                <a:schemeClr val="accent1"/>
-              </a:buClr>
-              <a:buSzPct val="80000"/>
-              <a:buFont typeface="Wingdings 3" charset="2"/>
-              <a:buChar char=""/>
-              <a:defRPr sz="1200" kern="1200">
-                <a:solidFill>
-                  <a:schemeClr val="tx1">
-                    <a:lumMod val="75000"/>
-                    <a:lumOff val="25000"/>
-                  </a:schemeClr>
-                </a:solidFill>
-                <a:latin typeface="+mn-lt"/>
-                <a:ea typeface="+mn-ea"/>
-                <a:cs typeface="+mn-cs"/>
-              </a:defRPr>
-            </a:lvl7pPr>
-            <a:lvl8pPr marL="3429000" indent="-228600" algn="l" defTabSz="457200" rtl="0" eaLnBrk="1" latinLnBrk="0" hangingPunct="1">
-              <a:spcBef>
-                <a:spcPts val="1000"/>
-              </a:spcBef>
-              <a:spcAft>
-                <a:spcPts val="0"/>
-              </a:spcAft>
-              <a:buClr>
-                <a:schemeClr val="accent1"/>
-              </a:buClr>
-              <a:buSzPct val="80000"/>
-              <a:buFont typeface="Wingdings 3" charset="2"/>
-              <a:buChar char=""/>
-              <a:defRPr sz="1200" kern="1200">
-                <a:solidFill>
-                  <a:schemeClr val="tx1">
-                    <a:lumMod val="75000"/>
-                    <a:lumOff val="25000"/>
-                  </a:schemeClr>
-                </a:solidFill>
-                <a:latin typeface="+mn-lt"/>
-                <a:ea typeface="+mn-ea"/>
-                <a:cs typeface="+mn-cs"/>
-              </a:defRPr>
-            </a:lvl8pPr>
-            <a:lvl9pPr marL="3886200" indent="-228600" algn="l" defTabSz="457200" rtl="0" eaLnBrk="1" latinLnBrk="0" hangingPunct="1">
-              <a:spcBef>
-                <a:spcPts val="1000"/>
-              </a:spcBef>
-              <a:spcAft>
-                <a:spcPts val="0"/>
-              </a:spcAft>
-              <a:buClr>
-                <a:schemeClr val="accent1"/>
-              </a:buClr>
-              <a:buSzPct val="80000"/>
-              <a:buFont typeface="Wingdings 3" charset="2"/>
-              <a:buChar char=""/>
-              <a:defRPr sz="1200" kern="1200">
-                <a:solidFill>
-                  <a:schemeClr val="tx1">
-                    <a:lumMod val="75000"/>
-                    <a:lumOff val="25000"/>
-                  </a:schemeClr>
-                </a:solidFill>
-                <a:latin typeface="+mn-lt"/>
-                <a:ea typeface="+mn-ea"/>
-                <a:cs typeface="+mn-cs"/>
-              </a:defRPr>
-            </a:lvl9pPr>
-          </a:lstStyle>
+          <a:lstStyle/>
+          <a:p>
+            <a:endParaRPr lang="pl-PL"/>
+          </a:p>
+        </p:txBody>
+      </p:sp>
+      <p:sp>
+        <p:nvSpPr>
+          <p:cNvPr id="6" name="TextBox 5">
+            <a:extLst>
+              <a:ext uri="{FF2B5EF4-FFF2-40B4-BE49-F238E27FC236}">
+                <a16:creationId xmlns:a16="http://schemas.microsoft.com/office/drawing/2014/main" id="{708D873C-0609-49A2-B8F1-54D9D3AAF8DC}"/>
+              </a:ext>
+            </a:extLst>
+          </p:cNvPr>
+          <p:cNvSpPr txBox="1"/>
+          <p:nvPr/>
+        </p:nvSpPr>
+        <p:spPr>
+          <a:xfrm>
+            <a:off x="9362528" y="4157662"/>
+            <a:ext cx="1829347" cy="338554"/>
+          </a:xfrm>
+          <a:prstGeom prst="rect">
+            <a:avLst/>
+          </a:prstGeom>
+          <a:noFill/>
+        </p:spPr>
+        <p:txBody>
+          <a:bodyPr wrap="none" rtlCol="0">
+            <a:spAutoFit/>
+          </a:bodyPr>
+          <a:lstStyle/>
           <a:p>
             <a:r>
               <a:rPr lang="en-US" sz="1600" dirty="0"/>
-              <a:t>Significant efforts are required to plan and keep interfaces consistency between microservices. If one team changes the protocol – other services might stop working.</a:t>
-            </a:r>
-          </a:p>
-          <a:p>
-            <a:r>
-              <a:rPr lang="en-US" sz="1600" dirty="0"/>
-              <a:t>Microservices are modeled as isolated units that manage a reduced set of problems. However, in reality fully functional systems rely on the cooperation and integration of its parts. Often it is hard to make microservices truly independent. </a:t>
-            </a:r>
-          </a:p>
-          <a:p>
-            <a:r>
-              <a:rPr lang="en-US" sz="1600" dirty="0"/>
-              <a:t>One important question you should ask yourself when working with separate microservices inside a problem domain is: “Are these services talking too much with each other?” If so, consider to merge them to a single service. Microservices should be small, but no smaller than necessary to be convenient.</a:t>
-            </a:r>
+              <a:t>Horizontal scaling</a:t>
+            </a:r>
+            <a:endParaRPr lang="pl-PL" sz="1600" dirty="0"/>
           </a:p>
         </p:txBody>
       </p:sp>
     </p:spTree>
     <p:extLst>
       <p:ext uri="{BB962C8B-B14F-4D97-AF65-F5344CB8AC3E}">
-        <p14:creationId xmlns:p14="http://schemas.microsoft.com/office/powerpoint/2010/main" val="2317993237"/>
+        <p14:creationId xmlns:p14="http://schemas.microsoft.com/office/powerpoint/2010/main" val="1937610585"/>
       </p:ext>
     </p:extLst>
   </p:cSld>

</xml_diff>